<commit_message>
PPT update (backend responsibilites)
</commit_message>
<xml_diff>
--- a/docs/tussentijdse_presentatie.pptx
+++ b/docs/tussentijdse_presentatie.pptx
@@ -204,7 +204,7 @@
           <a:p>
             <a:fld id="{1608E322-CB26-4988-8AFC-23BFFE53924A}" type="datetimeFigureOut">
               <a:rPr lang="en-US" smtClean="0"/>
-              <a:t>3/26/2023</a:t>
+              <a:t>3/29/2023</a:t>
             </a:fld>
             <a:endParaRPr lang="en-US"/>
           </a:p>
@@ -1121,7 +1121,7 @@
           <a:p>
             <a:fld id="{D6D0F569-AC90-44EB-9EF4-4E5C2F5D823C}" type="datetime1">
               <a:rPr lang="en-US" smtClean="0"/>
-              <a:t>3/26/2023</a:t>
+              <a:t>3/29/2023</a:t>
             </a:fld>
             <a:endParaRPr lang="en-US" dirty="0"/>
           </a:p>
@@ -1800,7 +1800,7 @@
           <a:p>
             <a:fld id="{46BA7D41-E8B7-4A0B-B861-3EC4AE88917D}" type="datetime1">
               <a:rPr lang="en-US" smtClean="0"/>
-              <a:t>3/26/2023</a:t>
+              <a:t>3/29/2023</a:t>
             </a:fld>
             <a:endParaRPr lang="en-US" dirty="0"/>
           </a:p>
@@ -2489,7 +2489,7 @@
           <a:p>
             <a:fld id="{A7C34823-0B19-4B4E-A643-7A3B0A3D24D6}" type="datetime1">
               <a:rPr lang="en-US" smtClean="0"/>
-              <a:t>3/26/2023</a:t>
+              <a:t>3/29/2023</a:t>
             </a:fld>
             <a:endParaRPr lang="en-US" dirty="0"/>
           </a:p>
@@ -3171,7 +3171,7 @@
           <a:p>
             <a:fld id="{8C2D79EF-17C8-45D8-9866-DAF5723FC604}" type="datetime1">
               <a:rPr lang="en-US" smtClean="0"/>
-              <a:t>3/26/2023</a:t>
+              <a:t>3/29/2023</a:t>
             </a:fld>
             <a:endParaRPr lang="en-US" dirty="0"/>
           </a:p>
@@ -3926,7 +3926,7 @@
           <a:p>
             <a:fld id="{DFFC2ADC-3680-4013-A757-E4663495DB98}" type="datetime1">
               <a:rPr lang="en-US" smtClean="0"/>
-              <a:t>3/26/2023</a:t>
+              <a:t>3/29/2023</a:t>
             </a:fld>
             <a:endParaRPr lang="en-US" dirty="0"/>
           </a:p>
@@ -4673,7 +4673,7 @@
           <a:p>
             <a:fld id="{4751BA94-5DCA-4F19-960F-0FB2BD5EE85A}" type="datetime1">
               <a:rPr lang="en-US" smtClean="0"/>
-              <a:t>3/26/2023</a:t>
+              <a:t>3/29/2023</a:t>
             </a:fld>
             <a:endParaRPr lang="en-US" dirty="0"/>
           </a:p>
@@ -5567,7 +5567,7 @@
           <a:p>
             <a:fld id="{01BED947-38D9-44AC-8B89-E79758333B77}" type="datetime1">
               <a:rPr lang="en-US" smtClean="0"/>
-              <a:t>3/26/2023</a:t>
+              <a:t>3/29/2023</a:t>
             </a:fld>
             <a:endParaRPr lang="en-US" dirty="0"/>
           </a:p>
@@ -6188,7 +6188,7 @@
           <a:p>
             <a:fld id="{3781E23F-BD3C-4F23-B116-2B758120C8AC}" type="datetime1">
               <a:rPr lang="en-US" smtClean="0"/>
-              <a:t>3/26/2023</a:t>
+              <a:t>3/29/2023</a:t>
             </a:fld>
             <a:endParaRPr lang="en-US" dirty="0"/>
           </a:p>
@@ -6780,7 +6780,7 @@
           <a:p>
             <a:fld id="{473CFAA9-6D59-4D98-869E-ACBDB83B2CA4}" type="datetime1">
               <a:rPr lang="en-US" smtClean="0"/>
-              <a:t>3/26/2023</a:t>
+              <a:t>3/29/2023</a:t>
             </a:fld>
             <a:endParaRPr lang="en-US"/>
           </a:p>
@@ -7572,7 +7572,7 @@
           <a:p>
             <a:fld id="{DC410804-27E3-430A-BB42-B831260DE39A}" type="datetime1">
               <a:rPr lang="en-US" smtClean="0"/>
-              <a:t>3/26/2023</a:t>
+              <a:t>3/29/2023</a:t>
             </a:fld>
             <a:endParaRPr lang="en-US" dirty="0"/>
           </a:p>
@@ -8343,7 +8343,7 @@
           <a:p>
             <a:fld id="{60E22DE3-3D1A-4D53-B9A6-6C7463B8C992}" type="datetime1">
               <a:rPr lang="en-US" smtClean="0"/>
-              <a:t>3/26/2023</a:t>
+              <a:t>3/29/2023</a:t>
             </a:fld>
             <a:endParaRPr lang="en-US" dirty="0"/>
           </a:p>
@@ -8654,7 +8654,7 @@
             <a:fld id="{5ECD8B30-1B71-45A1-8314-D59C86F581E1}" type="datetime1">
               <a:rPr lang="en-US" smtClean="0"/>
               <a:pPr/>
-              <a:t>3/26/2023</a:t>
+              <a:t>3/29/2023</a:t>
             </a:fld>
             <a:endParaRPr lang="en-US" b="1" dirty="0"/>
           </a:p>
@@ -9253,7 +9253,15 @@
           <a:p>
             <a:r>
               <a:rPr lang="en-US" dirty="0"/>
-              <a:t>Adrian: Backend &amp; Systems</a:t>
+              <a:t>Adrian: Backend (BL/</a:t>
+            </a:r>
+            <a:r>
+              <a:rPr lang="en-US" dirty="0" err="1"/>
+              <a:t>DL+Server+DB</a:t>
+            </a:r>
+            <a:r>
+              <a:rPr lang="en-US" dirty="0"/>
+              <a:t>)</a:t>
             </a:r>
           </a:p>
           <a:p>
@@ -9277,8 +9285,17 @@
           <a:p>
             <a:r>
               <a:rPr lang="en-US" dirty="0"/>
-              <a:t>Zeno: Backend &amp; Database</a:t>
-            </a:r>
+              <a:t>Zeno: Backend (</a:t>
+            </a:r>
+            <a:r>
+              <a:rPr lang="en-US" dirty="0" err="1"/>
+              <a:t>Architectuur+API+BL</a:t>
+            </a:r>
+            <a:r>
+              <a:rPr lang="en-US"/>
+              <a:t>/DL)</a:t>
+            </a:r>
+            <a:endParaRPr lang="en-US" dirty="0"/>
           </a:p>
         </p:txBody>
       </p:sp>

</xml_diff>

<commit_message>
presentatie update (architectuur -> architecture)
</commit_message>
<xml_diff>
--- a/docs/tussentijdse_presentatie.pptx
+++ b/docs/tussentijdse_presentatie.pptx
@@ -204,7 +204,7 @@
           <a:p>
             <a:fld id="{1608E322-CB26-4988-8AFC-23BFFE53924A}" type="datetimeFigureOut">
               <a:rPr lang="en-US" smtClean="0"/>
-              <a:t>3/29/2023</a:t>
+              <a:t>3/30/2023</a:t>
             </a:fld>
             <a:endParaRPr lang="en-US"/>
           </a:p>
@@ -1121,7 +1121,7 @@
           <a:p>
             <a:fld id="{D6D0F569-AC90-44EB-9EF4-4E5C2F5D823C}" type="datetime1">
               <a:rPr lang="en-US" smtClean="0"/>
-              <a:t>3/29/2023</a:t>
+              <a:t>3/30/2023</a:t>
             </a:fld>
             <a:endParaRPr lang="en-US" dirty="0"/>
           </a:p>
@@ -1800,7 +1800,7 @@
           <a:p>
             <a:fld id="{46BA7D41-E8B7-4A0B-B861-3EC4AE88917D}" type="datetime1">
               <a:rPr lang="en-US" smtClean="0"/>
-              <a:t>3/29/2023</a:t>
+              <a:t>3/30/2023</a:t>
             </a:fld>
             <a:endParaRPr lang="en-US" dirty="0"/>
           </a:p>
@@ -2489,7 +2489,7 @@
           <a:p>
             <a:fld id="{A7C34823-0B19-4B4E-A643-7A3B0A3D24D6}" type="datetime1">
               <a:rPr lang="en-US" smtClean="0"/>
-              <a:t>3/29/2023</a:t>
+              <a:t>3/30/2023</a:t>
             </a:fld>
             <a:endParaRPr lang="en-US" dirty="0"/>
           </a:p>
@@ -3171,7 +3171,7 @@
           <a:p>
             <a:fld id="{8C2D79EF-17C8-45D8-9866-DAF5723FC604}" type="datetime1">
               <a:rPr lang="en-US" smtClean="0"/>
-              <a:t>3/29/2023</a:t>
+              <a:t>3/30/2023</a:t>
             </a:fld>
             <a:endParaRPr lang="en-US" dirty="0"/>
           </a:p>
@@ -3926,7 +3926,7 @@
           <a:p>
             <a:fld id="{DFFC2ADC-3680-4013-A757-E4663495DB98}" type="datetime1">
               <a:rPr lang="en-US" smtClean="0"/>
-              <a:t>3/29/2023</a:t>
+              <a:t>3/30/2023</a:t>
             </a:fld>
             <a:endParaRPr lang="en-US" dirty="0"/>
           </a:p>
@@ -4673,7 +4673,7 @@
           <a:p>
             <a:fld id="{4751BA94-5DCA-4F19-960F-0FB2BD5EE85A}" type="datetime1">
               <a:rPr lang="en-US" smtClean="0"/>
-              <a:t>3/29/2023</a:t>
+              <a:t>3/30/2023</a:t>
             </a:fld>
             <a:endParaRPr lang="en-US" dirty="0"/>
           </a:p>
@@ -5567,7 +5567,7 @@
           <a:p>
             <a:fld id="{01BED947-38D9-44AC-8B89-E79758333B77}" type="datetime1">
               <a:rPr lang="en-US" smtClean="0"/>
-              <a:t>3/29/2023</a:t>
+              <a:t>3/30/2023</a:t>
             </a:fld>
             <a:endParaRPr lang="en-US" dirty="0"/>
           </a:p>
@@ -6188,7 +6188,7 @@
           <a:p>
             <a:fld id="{3781E23F-BD3C-4F23-B116-2B758120C8AC}" type="datetime1">
               <a:rPr lang="en-US" smtClean="0"/>
-              <a:t>3/29/2023</a:t>
+              <a:t>3/30/2023</a:t>
             </a:fld>
             <a:endParaRPr lang="en-US" dirty="0"/>
           </a:p>
@@ -6780,7 +6780,7 @@
           <a:p>
             <a:fld id="{473CFAA9-6D59-4D98-869E-ACBDB83B2CA4}" type="datetime1">
               <a:rPr lang="en-US" smtClean="0"/>
-              <a:t>3/29/2023</a:t>
+              <a:t>3/30/2023</a:t>
             </a:fld>
             <a:endParaRPr lang="en-US"/>
           </a:p>
@@ -7572,7 +7572,7 @@
           <a:p>
             <a:fld id="{DC410804-27E3-430A-BB42-B831260DE39A}" type="datetime1">
               <a:rPr lang="en-US" smtClean="0"/>
-              <a:t>3/29/2023</a:t>
+              <a:t>3/30/2023</a:t>
             </a:fld>
             <a:endParaRPr lang="en-US" dirty="0"/>
           </a:p>
@@ -8343,7 +8343,7 @@
           <a:p>
             <a:fld id="{60E22DE3-3D1A-4D53-B9A6-6C7463B8C992}" type="datetime1">
               <a:rPr lang="en-US" smtClean="0"/>
-              <a:t>3/29/2023</a:t>
+              <a:t>3/30/2023</a:t>
             </a:fld>
             <a:endParaRPr lang="en-US" dirty="0"/>
           </a:p>
@@ -8654,7 +8654,7 @@
             <a:fld id="{5ECD8B30-1B71-45A1-8314-D59C86F581E1}" type="datetime1">
               <a:rPr lang="en-US" smtClean="0"/>
               <a:pPr/>
-              <a:t>3/29/2023</a:t>
+              <a:t>3/30/2023</a:t>
             </a:fld>
             <a:endParaRPr lang="en-US" b="1" dirty="0"/>
           </a:p>
@@ -9288,14 +9288,17 @@
               <a:t>Zeno: Backend (</a:t>
             </a:r>
             <a:r>
+              <a:rPr lang="en-US"/>
+              <a:t>Architecture+</a:t>
+            </a:r>
+            <a:r>
               <a:rPr lang="en-US" dirty="0" err="1"/>
-              <a:t>Architectuur+API+BL</a:t>
-            </a:r>
-            <a:r>
-              <a:rPr lang="en-US"/>
+              <a:t>API+BL</a:t>
+            </a:r>
+            <a:r>
+              <a:rPr lang="en-US" dirty="0"/>
               <a:t>/DL)</a:t>
             </a:r>
-            <a:endParaRPr lang="en-US" dirty="0"/>
           </a:p>
         </p:txBody>
       </p:sp>

</xml_diff>